<commit_message>
Refactored to use DTO
</commit_message>
<xml_diff>
--- a/MyMindNotes 기획/나의 마음 일지 모듈화 방법 선택.pptx
+++ b/MyMindNotes 기획/나의 마음 일지 모듈화 방법 선택.pptx
@@ -2525,7 +2525,7 @@
           </a:r>
           <a:r>
             <a:rPr lang="en-US" altLang="ko-KR" sz="1400" dirty="0"/>
-            <a:t>, data sources, models, retrofit </a:t>
+            <a:t>, data sources, retrofit </a:t>
           </a:r>
           <a:r>
             <a:rPr lang="en-US" altLang="ko-KR" sz="1400" dirty="0" err="1"/>
@@ -2653,15 +2653,7 @@
           </a:r>
           <a:r>
             <a:rPr lang="en-US" altLang="ko-KR" sz="600" b="0" dirty="0"/>
-            <a:t>/Scopes Modules, </a:t>
-          </a:r>
-          <a:r>
-            <a:rPr lang="en-US" altLang="ko-KR" sz="600" b="0" dirty="0" err="1"/>
-            <a:t>UserDiary</a:t>
-          </a:r>
-          <a:r>
-            <a:rPr lang="en-US" altLang="ko-KR" sz="600" b="0" dirty="0"/>
-            <a:t> Model</a:t>
+            <a:t>/Scopes Modules, DTOs</a:t>
           </a:r>
           <a:endParaRPr lang="ko-KR" altLang="en-US" sz="600" b="1" dirty="0"/>
         </a:p>
@@ -8941,15 +8933,7 @@
           </a:r>
           <a:r>
             <a:rPr lang="en-US" altLang="ko-KR" sz="600" b="0" kern="1200" dirty="0"/>
-            <a:t>/Scopes Modules, </a:t>
-          </a:r>
-          <a:r>
-            <a:rPr lang="en-US" altLang="ko-KR" sz="600" b="0" kern="1200" dirty="0" err="1"/>
-            <a:t>UserDiary</a:t>
-          </a:r>
-          <a:r>
-            <a:rPr lang="en-US" altLang="ko-KR" sz="600" b="0" kern="1200" dirty="0"/>
-            <a:t> Model</a:t>
+            <a:t>/Scopes Modules, DTOs</a:t>
           </a:r>
           <a:endParaRPr lang="ko-KR" altLang="en-US" sz="600" b="1" kern="1200" dirty="0"/>
         </a:p>
@@ -9402,7 +9386,7 @@
           </a:r>
           <a:r>
             <a:rPr lang="en-US" altLang="ko-KR" sz="1400" kern="1200" dirty="0"/>
-            <a:t>, data sources, models, retrofit </a:t>
+            <a:t>, data sources, retrofit </a:t>
           </a:r>
           <a:r>
             <a:rPr lang="en-US" altLang="ko-KR" sz="1400" kern="1200" dirty="0" err="1"/>
@@ -27204,7 +27188,7 @@
           <a:p>
             <a:fld id="{EDB8FCC8-1576-4E05-820C-3A6DFBA7176C}" type="datetimeFigureOut">
               <a:rPr lang="ko-KR" altLang="en-US" smtClean="0"/>
-              <a:t>2023-07-23</a:t>
+              <a:t>2023-08-03</a:t>
             </a:fld>
             <a:endParaRPr lang="ko-KR" altLang="en-US"/>
           </a:p>
@@ -27402,7 +27386,7 @@
           <a:p>
             <a:fld id="{EDB8FCC8-1576-4E05-820C-3A6DFBA7176C}" type="datetimeFigureOut">
               <a:rPr lang="ko-KR" altLang="en-US" smtClean="0"/>
-              <a:t>2023-07-23</a:t>
+              <a:t>2023-08-03</a:t>
             </a:fld>
             <a:endParaRPr lang="ko-KR" altLang="en-US"/>
           </a:p>
@@ -27610,7 +27594,7 @@
           <a:p>
             <a:fld id="{EDB8FCC8-1576-4E05-820C-3A6DFBA7176C}" type="datetimeFigureOut">
               <a:rPr lang="ko-KR" altLang="en-US" smtClean="0"/>
-              <a:t>2023-07-23</a:t>
+              <a:t>2023-08-03</a:t>
             </a:fld>
             <a:endParaRPr lang="ko-KR" altLang="en-US"/>
           </a:p>
@@ -27808,7 +27792,7 @@
           <a:p>
             <a:fld id="{EDB8FCC8-1576-4E05-820C-3A6DFBA7176C}" type="datetimeFigureOut">
               <a:rPr lang="ko-KR" altLang="en-US" smtClean="0"/>
-              <a:t>2023-07-23</a:t>
+              <a:t>2023-08-03</a:t>
             </a:fld>
             <a:endParaRPr lang="ko-KR" altLang="en-US"/>
           </a:p>
@@ -28083,7 +28067,7 @@
           <a:p>
             <a:fld id="{EDB8FCC8-1576-4E05-820C-3A6DFBA7176C}" type="datetimeFigureOut">
               <a:rPr lang="ko-KR" altLang="en-US" smtClean="0"/>
-              <a:t>2023-07-23</a:t>
+              <a:t>2023-08-03</a:t>
             </a:fld>
             <a:endParaRPr lang="ko-KR" altLang="en-US"/>
           </a:p>
@@ -28348,7 +28332,7 @@
           <a:p>
             <a:fld id="{EDB8FCC8-1576-4E05-820C-3A6DFBA7176C}" type="datetimeFigureOut">
               <a:rPr lang="ko-KR" altLang="en-US" smtClean="0"/>
-              <a:t>2023-07-23</a:t>
+              <a:t>2023-08-03</a:t>
             </a:fld>
             <a:endParaRPr lang="ko-KR" altLang="en-US"/>
           </a:p>
@@ -28760,7 +28744,7 @@
           <a:p>
             <a:fld id="{EDB8FCC8-1576-4E05-820C-3A6DFBA7176C}" type="datetimeFigureOut">
               <a:rPr lang="ko-KR" altLang="en-US" smtClean="0"/>
-              <a:t>2023-07-23</a:t>
+              <a:t>2023-08-03</a:t>
             </a:fld>
             <a:endParaRPr lang="ko-KR" altLang="en-US"/>
           </a:p>
@@ -28901,7 +28885,7 @@
           <a:p>
             <a:fld id="{EDB8FCC8-1576-4E05-820C-3A6DFBA7176C}" type="datetimeFigureOut">
               <a:rPr lang="ko-KR" altLang="en-US" smtClean="0"/>
-              <a:t>2023-07-23</a:t>
+              <a:t>2023-08-03</a:t>
             </a:fld>
             <a:endParaRPr lang="ko-KR" altLang="en-US"/>
           </a:p>
@@ -29014,7 +28998,7 @@
           <a:p>
             <a:fld id="{EDB8FCC8-1576-4E05-820C-3A6DFBA7176C}" type="datetimeFigureOut">
               <a:rPr lang="ko-KR" altLang="en-US" smtClean="0"/>
-              <a:t>2023-07-23</a:t>
+              <a:t>2023-08-03</a:t>
             </a:fld>
             <a:endParaRPr lang="ko-KR" altLang="en-US"/>
           </a:p>
@@ -29325,7 +29309,7 @@
           <a:p>
             <a:fld id="{EDB8FCC8-1576-4E05-820C-3A6DFBA7176C}" type="datetimeFigureOut">
               <a:rPr lang="ko-KR" altLang="en-US" smtClean="0"/>
-              <a:t>2023-07-23</a:t>
+              <a:t>2023-08-03</a:t>
             </a:fld>
             <a:endParaRPr lang="ko-KR" altLang="en-US"/>
           </a:p>
@@ -29613,7 +29597,7 @@
           <a:p>
             <a:fld id="{EDB8FCC8-1576-4E05-820C-3A6DFBA7176C}" type="datetimeFigureOut">
               <a:rPr lang="ko-KR" altLang="en-US" smtClean="0"/>
-              <a:t>2023-07-23</a:t>
+              <a:t>2023-08-03</a:t>
             </a:fld>
             <a:endParaRPr lang="ko-KR" altLang="en-US"/>
           </a:p>
@@ -29854,7 +29838,7 @@
           <a:p>
             <a:fld id="{EDB8FCC8-1576-4E05-820C-3A6DFBA7176C}" type="datetimeFigureOut">
               <a:rPr lang="ko-KR" altLang="en-US" smtClean="0"/>
-              <a:t>2023-07-23</a:t>
+              <a:t>2023-08-03</a:t>
             </a:fld>
             <a:endParaRPr lang="ko-KR" altLang="en-US"/>
           </a:p>
@@ -30465,7 +30449,7 @@
             <p:nvPr>
               <p:extLst>
                 <p:ext uri="{D42A27DB-BD31-4B8C-83A1-F6EECF244321}">
-                  <p14:modId xmlns:p14="http://schemas.microsoft.com/office/powerpoint/2010/main" val="1845658576"/>
+                  <p14:modId xmlns:p14="http://schemas.microsoft.com/office/powerpoint/2010/main" val="2171698808"/>
                 </p:ext>
               </p:extLst>
             </p:nvPr>

</xml_diff>